<commit_message>
Some slight changes to graphs added a slide
</commit_message>
<xml_diff>
--- a/EDA Presentation.pptx
+++ b/EDA Presentation.pptx
@@ -3515,10 +3515,10 @@
       </p:pic>
       <p:pic>
         <p:nvPicPr>
-          <p:cNvPr id="7" name="Picture 6">
-            <a:extLst>
-              <a:ext uri="{FF2B5EF4-FFF2-40B4-BE49-F238E27FC236}">
-                <a16:creationId xmlns:a16="http://schemas.microsoft.com/office/drawing/2014/main" id="{56D18AA5-BB50-41AA-A8D9-960E8028DCCD}"/>
+          <p:cNvPr id="8" name="Picture 7">
+            <a:extLst>
+              <a:ext uri="{FF2B5EF4-FFF2-40B4-BE49-F238E27FC236}">
+                <a16:creationId xmlns:a16="http://schemas.microsoft.com/office/drawing/2014/main" id="{C3E4254A-AA45-4886-BB56-687FAB46B871}"/>
               </a:ext>
             </a:extLst>
           </p:cNvPr>
@@ -3529,36 +3529,6 @@
         </p:nvPicPr>
         <p:blipFill>
           <a:blip r:embed="rId4"/>
-          <a:stretch>
-            <a:fillRect/>
-          </a:stretch>
-        </p:blipFill>
-        <p:spPr>
-          <a:xfrm>
-            <a:off x="2645221" y="4114422"/>
-            <a:ext cx="3876510" cy="2392361"/>
-          </a:xfrm>
-          <a:prstGeom prst="rect">
-            <a:avLst/>
-          </a:prstGeom>
-        </p:spPr>
-      </p:pic>
-      <p:pic>
-        <p:nvPicPr>
-          <p:cNvPr id="8" name="Picture 7">
-            <a:extLst>
-              <a:ext uri="{FF2B5EF4-FFF2-40B4-BE49-F238E27FC236}">
-                <a16:creationId xmlns:a16="http://schemas.microsoft.com/office/drawing/2014/main" id="{C3E4254A-AA45-4886-BB56-687FAB46B871}"/>
-              </a:ext>
-            </a:extLst>
-          </p:cNvPr>
-          <p:cNvPicPr>
-            <a:picLocks noChangeAspect="1"/>
-          </p:cNvPicPr>
-          <p:nvPr/>
-        </p:nvPicPr>
-        <p:blipFill>
-          <a:blip r:embed="rId5"/>
           <a:stretch>
             <a:fillRect/>
           </a:stretch>
@@ -3669,6 +3639,36 @@
           </a:p>
         </p:txBody>
       </p:sp>
+      <p:pic>
+        <p:nvPicPr>
+          <p:cNvPr id="3" name="Picture 2">
+            <a:extLst>
+              <a:ext uri="{FF2B5EF4-FFF2-40B4-BE49-F238E27FC236}">
+                <a16:creationId xmlns:a16="http://schemas.microsoft.com/office/drawing/2014/main" id="{2A95C4DF-467F-4FD9-9B21-A800909C598D}"/>
+              </a:ext>
+            </a:extLst>
+          </p:cNvPr>
+          <p:cNvPicPr>
+            <a:picLocks noChangeAspect="1"/>
+          </p:cNvPicPr>
+          <p:nvPr/>
+        </p:nvPicPr>
+        <p:blipFill>
+          <a:blip r:embed="rId5"/>
+          <a:stretch>
+            <a:fillRect/>
+          </a:stretch>
+        </p:blipFill>
+        <p:spPr>
+          <a:xfrm>
+            <a:off x="2713065" y="4106589"/>
+            <a:ext cx="3866667" cy="2386286"/>
+          </a:xfrm>
+          <a:prstGeom prst="rect">
+            <a:avLst/>
+          </a:prstGeom>
+        </p:spPr>
+      </p:pic>
     </p:spTree>
     <p:extLst>
       <p:ext uri="{BB962C8B-B14F-4D97-AF65-F5344CB8AC3E}">
@@ -5335,6 +5335,20 @@
             <a:br>
               <a:rPr lang="en-US" dirty="0"/>
             </a:br>
+            <a:endParaRPr lang="en-US" dirty="0"/>
+          </a:p>
+          <a:p>
+            <a:pPr lvl="1"/>
+            <a:endParaRPr lang="en-US" dirty="0"/>
+          </a:p>
+          <a:p>
+            <a:pPr lvl="1"/>
+            <a:endParaRPr lang="en-US" dirty="0"/>
+          </a:p>
+          <a:p>
+            <a:pPr marL="457200" lvl="1" indent="0">
+              <a:buNone/>
+            </a:pPr>
             <a:endParaRPr lang="en-US" dirty="0"/>
           </a:p>
           <a:p>

</xml_diff>